<commit_message>
Update 02.1 File Structure PP
</commit_message>
<xml_diff>
--- a/Programming 4/01.1 Intro to C++ CLI/01.1 Intro to C++ CLI.pptx
+++ b/Programming 4/01.1 Intro to C++ CLI/01.1 Intro to C++ CLI.pptx
@@ -243,7 +243,7 @@
           <a:p>
             <a:fld id="{1F2964D9-9A2E-4F10-B864-D3ADDA7AC871}" type="datetimeFigureOut">
               <a:rPr lang="en-NZ" smtClean="0"/>
-              <a:t>23/07/19</a:t>
+              <a:t>28/07/19</a:t>
             </a:fld>
             <a:endParaRPr lang="en-NZ"/>
           </a:p>
@@ -1063,11 +1063,7 @@
             </a:pPr>
             <a:r>
               <a:rPr lang="en-NZ" dirty="0" smtClean="0"/>
-              <a:t>a </a:t>
-            </a:r>
-            <a:r>
-              <a:rPr lang="en-NZ" dirty="0" smtClean="0"/>
-              <a:t>= b++</a:t>
+              <a:t>a = b++</a:t>
             </a:r>
           </a:p>
           <a:p>
@@ -1116,13 +1112,8 @@
             </a:r>
             <a:r>
               <a:rPr lang="en-NZ" baseline="0" dirty="0" smtClean="0"/>
-              <a:t> </a:t>
-            </a:r>
-            <a:r>
-              <a:rPr lang="en-NZ" baseline="0" dirty="0" smtClean="0"/>
-              <a:t>1 + 1</a:t>
-            </a:r>
-            <a:endParaRPr lang="en-NZ" baseline="0" dirty="0" smtClean="0"/>
+              <a:t> 1 + 1</a:t>
+            </a:r>
           </a:p>
           <a:p>
             <a:pPr marL="628650" lvl="1" indent="-171450">
@@ -5358,7 +5349,7 @@
           <a:p>
             <a:fld id="{F8166F1F-CE9B-4651-A6AA-CD717754106B}" type="datetimeFigureOut">
               <a:rPr lang="en-US" smtClean="0"/>
-              <a:t>7/23/19</a:t>
+              <a:t>7/28/19</a:t>
             </a:fld>
             <a:endParaRPr lang="en-US"/>
           </a:p>
@@ -5523,7 +5514,7 @@
           <a:p>
             <a:fld id="{A76116CE-C4A3-4A05-B2D7-7C2E9A889C0F}" type="datetimeFigureOut">
               <a:rPr lang="en-US" smtClean="0"/>
-              <a:t>7/23/19</a:t>
+              <a:t>7/28/19</a:t>
             </a:fld>
             <a:endParaRPr lang="en-US"/>
           </a:p>
@@ -5698,7 +5689,7 @@
           <a:p>
             <a:fld id="{A76116CE-C4A3-4A05-B2D7-7C2E9A889C0F}" type="datetimeFigureOut">
               <a:rPr lang="en-US" smtClean="0"/>
-              <a:t>7/23/19</a:t>
+              <a:t>7/28/19</a:t>
             </a:fld>
             <a:endParaRPr lang="en-US"/>
           </a:p>
@@ -5865,7 +5856,7 @@
           <a:p>
             <a:fld id="{A76116CE-C4A3-4A05-B2D7-7C2E9A889C0F}" type="datetimeFigureOut">
               <a:rPr lang="en-US" smtClean="0"/>
-              <a:t>7/23/19</a:t>
+              <a:t>7/28/19</a:t>
             </a:fld>
             <a:endParaRPr lang="en-US"/>
           </a:p>
@@ -6106,7 +6097,7 @@
           <a:p>
             <a:fld id="{A76116CE-C4A3-4A05-B2D7-7C2E9A889C0F}" type="datetimeFigureOut">
               <a:rPr lang="en-US" smtClean="0"/>
-              <a:t>7/23/19</a:t>
+              <a:t>7/28/19</a:t>
             </a:fld>
             <a:endParaRPr lang="en-US"/>
           </a:p>
@@ -6389,7 +6380,7 @@
           <a:p>
             <a:fld id="{A76116CE-C4A3-4A05-B2D7-7C2E9A889C0F}" type="datetimeFigureOut">
               <a:rPr lang="en-US" smtClean="0"/>
-              <a:t>7/23/19</a:t>
+              <a:t>7/28/19</a:t>
             </a:fld>
             <a:endParaRPr lang="en-US"/>
           </a:p>
@@ -6806,7 +6797,7 @@
           <a:p>
             <a:fld id="{A76116CE-C4A3-4A05-B2D7-7C2E9A889C0F}" type="datetimeFigureOut">
               <a:rPr lang="en-US" smtClean="0"/>
-              <a:t>7/23/19</a:t>
+              <a:t>7/28/19</a:t>
             </a:fld>
             <a:endParaRPr lang="en-US"/>
           </a:p>
@@ -6919,7 +6910,7 @@
           <a:p>
             <a:fld id="{A76116CE-C4A3-4A05-B2D7-7C2E9A889C0F}" type="datetimeFigureOut">
               <a:rPr lang="en-US" smtClean="0"/>
-              <a:t>7/23/19</a:t>
+              <a:t>7/28/19</a:t>
             </a:fld>
             <a:endParaRPr lang="en-US"/>
           </a:p>
@@ -7009,7 +7000,7 @@
           <a:p>
             <a:fld id="{A76116CE-C4A3-4A05-B2D7-7C2E9A889C0F}" type="datetimeFigureOut">
               <a:rPr lang="en-US" smtClean="0"/>
-              <a:t>7/23/19</a:t>
+              <a:t>7/28/19</a:t>
             </a:fld>
             <a:endParaRPr lang="en-US"/>
           </a:p>
@@ -7281,7 +7272,7 @@
           <a:p>
             <a:fld id="{A76116CE-C4A3-4A05-B2D7-7C2E9A889C0F}" type="datetimeFigureOut">
               <a:rPr lang="en-US" smtClean="0"/>
-              <a:t>7/23/19</a:t>
+              <a:t>7/28/19</a:t>
             </a:fld>
             <a:endParaRPr lang="en-US"/>
           </a:p>
@@ -7529,7 +7520,7 @@
           <a:p>
             <a:fld id="{A76116CE-C4A3-4A05-B2D7-7C2E9A889C0F}" type="datetimeFigureOut">
               <a:rPr lang="en-US" smtClean="0"/>
-              <a:t>7/23/19</a:t>
+              <a:t>7/28/19</a:t>
             </a:fld>
             <a:endParaRPr lang="en-US"/>
           </a:p>
@@ -7737,7 +7728,7 @@
           <a:p>
             <a:fld id="{F8166F1F-CE9B-4651-A6AA-CD717754106B}" type="datetimeFigureOut">
               <a:rPr lang="en-US" smtClean="0"/>
-              <a:t>7/23/19</a:t>
+              <a:t>7/28/19</a:t>
             </a:fld>
             <a:endParaRPr lang="en-US"/>
           </a:p>
@@ -8289,14 +8280,14 @@
                 <a:gridCol w="4268047">
                   <a:extLst>
                     <a:ext uri="{9D8B030D-6E8A-4147-A177-3AD203B41FA5}">
-                      <a16:colId xmlns="" xmlns:a16="http://schemas.microsoft.com/office/drawing/2014/main" val="1878650380"/>
+                      <a16:colId xmlns:a16="http://schemas.microsoft.com/office/drawing/2014/main" xmlns="" val="1878650380"/>
                     </a:ext>
                   </a:extLst>
                 </a:gridCol>
                 <a:gridCol w="2952271">
                   <a:extLst>
                     <a:ext uri="{9D8B030D-6E8A-4147-A177-3AD203B41FA5}">
-                      <a16:colId xmlns="" xmlns:a16="http://schemas.microsoft.com/office/drawing/2014/main" val="3514817832"/>
+                      <a16:colId xmlns:a16="http://schemas.microsoft.com/office/drawing/2014/main" xmlns="" val="3514817832"/>
                     </a:ext>
                   </a:extLst>
                 </a:gridCol>
@@ -8356,7 +8347,7 @@
                 </a:tc>
                 <a:extLst>
                   <a:ext uri="{0D108BD9-81ED-4DB2-BD59-A6C34878D82A}">
-                    <a16:rowId xmlns="" xmlns:a16="http://schemas.microsoft.com/office/drawing/2014/main" val="3083959343"/>
+                    <a16:rowId xmlns:a16="http://schemas.microsoft.com/office/drawing/2014/main" xmlns="" val="3083959343"/>
                   </a:ext>
                 </a:extLst>
               </a:tr>
@@ -8415,7 +8406,7 @@
                 </a:tc>
                 <a:extLst>
                   <a:ext uri="{0D108BD9-81ED-4DB2-BD59-A6C34878D82A}">
-                    <a16:rowId xmlns="" xmlns:a16="http://schemas.microsoft.com/office/drawing/2014/main" val="324899849"/>
+                    <a16:rowId xmlns:a16="http://schemas.microsoft.com/office/drawing/2014/main" xmlns="" val="324899849"/>
                   </a:ext>
                 </a:extLst>
               </a:tr>
@@ -8474,7 +8465,7 @@
                 </a:tc>
                 <a:extLst>
                   <a:ext uri="{0D108BD9-81ED-4DB2-BD59-A6C34878D82A}">
-                    <a16:rowId xmlns="" xmlns:a16="http://schemas.microsoft.com/office/drawing/2014/main" val="1715622986"/>
+                    <a16:rowId xmlns:a16="http://schemas.microsoft.com/office/drawing/2014/main" xmlns="" val="1715622986"/>
                   </a:ext>
                 </a:extLst>
               </a:tr>
@@ -8533,7 +8524,7 @@
                 </a:tc>
                 <a:extLst>
                   <a:ext uri="{0D108BD9-81ED-4DB2-BD59-A6C34878D82A}">
-                    <a16:rowId xmlns="" xmlns:a16="http://schemas.microsoft.com/office/drawing/2014/main" val="2107937398"/>
+                    <a16:rowId xmlns:a16="http://schemas.microsoft.com/office/drawing/2014/main" xmlns="" val="2107937398"/>
                   </a:ext>
                 </a:extLst>
               </a:tr>
@@ -8592,7 +8583,7 @@
                 </a:tc>
                 <a:extLst>
                   <a:ext uri="{0D108BD9-81ED-4DB2-BD59-A6C34878D82A}">
-                    <a16:rowId xmlns="" xmlns:a16="http://schemas.microsoft.com/office/drawing/2014/main" val="77502295"/>
+                    <a16:rowId xmlns:a16="http://schemas.microsoft.com/office/drawing/2014/main" xmlns="" val="77502295"/>
                   </a:ext>
                 </a:extLst>
               </a:tr>
@@ -8908,14 +8899,14 @@
                 <a:gridCol w="4268047">
                   <a:extLst>
                     <a:ext uri="{9D8B030D-6E8A-4147-A177-3AD203B41FA5}">
-                      <a16:colId xmlns="" xmlns:a16="http://schemas.microsoft.com/office/drawing/2014/main" val="1878650380"/>
+                      <a16:colId xmlns:a16="http://schemas.microsoft.com/office/drawing/2014/main" xmlns="" val="1878650380"/>
                     </a:ext>
                   </a:extLst>
                 </a:gridCol>
                 <a:gridCol w="2952271">
                   <a:extLst>
                     <a:ext uri="{9D8B030D-6E8A-4147-A177-3AD203B41FA5}">
-                      <a16:colId xmlns="" xmlns:a16="http://schemas.microsoft.com/office/drawing/2014/main" val="3514817832"/>
+                      <a16:colId xmlns:a16="http://schemas.microsoft.com/office/drawing/2014/main" xmlns="" val="3514817832"/>
                     </a:ext>
                   </a:extLst>
                 </a:gridCol>
@@ -8978,7 +8969,7 @@
                 </a:tc>
                 <a:extLst>
                   <a:ext uri="{0D108BD9-81ED-4DB2-BD59-A6C34878D82A}">
-                    <a16:rowId xmlns="" xmlns:a16="http://schemas.microsoft.com/office/drawing/2014/main" val="3083959343"/>
+                    <a16:rowId xmlns:a16="http://schemas.microsoft.com/office/drawing/2014/main" xmlns="" val="3083959343"/>
                   </a:ext>
                 </a:extLst>
               </a:tr>
@@ -9043,7 +9034,7 @@
                 </a:tc>
                 <a:extLst>
                   <a:ext uri="{0D108BD9-81ED-4DB2-BD59-A6C34878D82A}">
-                    <a16:rowId xmlns="" xmlns:a16="http://schemas.microsoft.com/office/drawing/2014/main" val="324899849"/>
+                    <a16:rowId xmlns:a16="http://schemas.microsoft.com/office/drawing/2014/main" xmlns="" val="324899849"/>
                   </a:ext>
                 </a:extLst>
               </a:tr>
@@ -9117,7 +9108,7 @@
                 </a:tc>
                 <a:extLst>
                   <a:ext uri="{0D108BD9-81ED-4DB2-BD59-A6C34878D82A}">
-                    <a16:rowId xmlns="" xmlns:a16="http://schemas.microsoft.com/office/drawing/2014/main" val="1715622986"/>
+                    <a16:rowId xmlns:a16="http://schemas.microsoft.com/office/drawing/2014/main" xmlns="" val="1715622986"/>
                   </a:ext>
                 </a:extLst>
               </a:tr>
@@ -9191,7 +9182,7 @@
                 </a:tc>
                 <a:extLst>
                   <a:ext uri="{0D108BD9-81ED-4DB2-BD59-A6C34878D82A}">
-                    <a16:rowId xmlns="" xmlns:a16="http://schemas.microsoft.com/office/drawing/2014/main" val="77502295"/>
+                    <a16:rowId xmlns:a16="http://schemas.microsoft.com/office/drawing/2014/main" xmlns="" val="77502295"/>
                   </a:ext>
                 </a:extLst>
               </a:tr>
@@ -9560,14 +9551,14 @@
                 <a:gridCol w="4268047">
                   <a:extLst>
                     <a:ext uri="{9D8B030D-6E8A-4147-A177-3AD203B41FA5}">
-                      <a16:colId xmlns="" xmlns:a16="http://schemas.microsoft.com/office/drawing/2014/main" val="1878650380"/>
+                      <a16:colId xmlns:a16="http://schemas.microsoft.com/office/drawing/2014/main" xmlns="" val="1878650380"/>
                     </a:ext>
                   </a:extLst>
                 </a:gridCol>
                 <a:gridCol w="2952271">
                   <a:extLst>
                     <a:ext uri="{9D8B030D-6E8A-4147-A177-3AD203B41FA5}">
-                      <a16:colId xmlns="" xmlns:a16="http://schemas.microsoft.com/office/drawing/2014/main" val="3514817832"/>
+                      <a16:colId xmlns:a16="http://schemas.microsoft.com/office/drawing/2014/main" xmlns="" val="3514817832"/>
                     </a:ext>
                   </a:extLst>
                 </a:gridCol>
@@ -9633,7 +9624,7 @@
                 </a:tc>
                 <a:extLst>
                   <a:ext uri="{0D108BD9-81ED-4DB2-BD59-A6C34878D82A}">
-                    <a16:rowId xmlns="" xmlns:a16="http://schemas.microsoft.com/office/drawing/2014/main" val="3083959343"/>
+                    <a16:rowId xmlns:a16="http://schemas.microsoft.com/office/drawing/2014/main" xmlns="" val="3083959343"/>
                   </a:ext>
                 </a:extLst>
               </a:tr>
@@ -9875,7 +9866,7 @@
                 </a:tc>
                 <a:extLst>
                   <a:ext uri="{0D108BD9-81ED-4DB2-BD59-A6C34878D82A}">
-                    <a16:rowId xmlns="" xmlns:a16="http://schemas.microsoft.com/office/drawing/2014/main" val="324899849"/>
+                    <a16:rowId xmlns:a16="http://schemas.microsoft.com/office/drawing/2014/main" xmlns="" val="324899849"/>
                   </a:ext>
                 </a:extLst>
               </a:tr>
@@ -9937,7 +9928,7 @@
                 </a:tc>
                 <a:extLst>
                   <a:ext uri="{0D108BD9-81ED-4DB2-BD59-A6C34878D82A}">
-                    <a16:rowId xmlns="" xmlns:a16="http://schemas.microsoft.com/office/drawing/2014/main" val="1715622986"/>
+                    <a16:rowId xmlns:a16="http://schemas.microsoft.com/office/drawing/2014/main" xmlns="" val="1715622986"/>
                   </a:ext>
                 </a:extLst>
               </a:tr>
@@ -10024,7 +10015,6 @@
               <a:rPr lang="en-US" sz="3500" b="1" dirty="0" smtClean="0"/>
               <a:t>Arithmetic operators</a:t>
             </a:r>
-            <a:endParaRPr lang="en-US" sz="3500" b="1" dirty="0" smtClean="0"/>
           </a:p>
           <a:p>
             <a:pPr marL="1657350" lvl="2" indent="-742950">
@@ -10048,8 +10038,13 @@
             </a:r>
             <a:r>
               <a:rPr lang="en-US" sz="2500" dirty="0" smtClean="0"/>
-              <a:t> operators have different effect</a:t>
-            </a:r>
+              <a:t> operators have different </a:t>
+            </a:r>
+            <a:r>
+              <a:rPr lang="en-US" sz="2500" dirty="0" smtClean="0"/>
+              <a:t>effects</a:t>
+            </a:r>
+            <a:endParaRPr lang="en-US" sz="2500" dirty="0" smtClean="0"/>
           </a:p>
           <a:p>
             <a:pPr lvl="2"/>
@@ -10134,14 +10129,14 @@
                 <a:gridCol w="4268047">
                   <a:extLst>
                     <a:ext uri="{9D8B030D-6E8A-4147-A177-3AD203B41FA5}">
-                      <a16:colId xmlns="" xmlns:a16="http://schemas.microsoft.com/office/drawing/2014/main" val="1878650380"/>
+                      <a16:colId xmlns:a16="http://schemas.microsoft.com/office/drawing/2014/main" xmlns="" val="1878650380"/>
                     </a:ext>
                   </a:extLst>
                 </a:gridCol>
                 <a:gridCol w="2952271">
                   <a:extLst>
                     <a:ext uri="{9D8B030D-6E8A-4147-A177-3AD203B41FA5}">
-                      <a16:colId xmlns="" xmlns:a16="http://schemas.microsoft.com/office/drawing/2014/main" val="3514817832"/>
+                      <a16:colId xmlns:a16="http://schemas.microsoft.com/office/drawing/2014/main" xmlns="" val="3514817832"/>
                     </a:ext>
                   </a:extLst>
                 </a:gridCol>
@@ -10207,7 +10202,7 @@
                 </a:tc>
                 <a:extLst>
                   <a:ext uri="{0D108BD9-81ED-4DB2-BD59-A6C34878D82A}">
-                    <a16:rowId xmlns="" xmlns:a16="http://schemas.microsoft.com/office/drawing/2014/main" val="3083959343"/>
+                    <a16:rowId xmlns:a16="http://schemas.microsoft.com/office/drawing/2014/main" xmlns="" val="3083959343"/>
                   </a:ext>
                 </a:extLst>
               </a:tr>
@@ -10266,7 +10261,7 @@
                 </a:tc>
                 <a:extLst>
                   <a:ext uri="{0D108BD9-81ED-4DB2-BD59-A6C34878D82A}">
-                    <a16:rowId xmlns="" xmlns:a16="http://schemas.microsoft.com/office/drawing/2014/main" val="324899849"/>
+                    <a16:rowId xmlns:a16="http://schemas.microsoft.com/office/drawing/2014/main" xmlns="" val="324899849"/>
                   </a:ext>
                 </a:extLst>
               </a:tr>
@@ -10337,7 +10332,7 @@
                 </a:tc>
                 <a:extLst>
                   <a:ext uri="{0D108BD9-81ED-4DB2-BD59-A6C34878D82A}">
-                    <a16:rowId xmlns="" xmlns:a16="http://schemas.microsoft.com/office/drawing/2014/main" val="1715622986"/>
+                    <a16:rowId xmlns:a16="http://schemas.microsoft.com/office/drawing/2014/main" xmlns="" val="1715622986"/>
                   </a:ext>
                 </a:extLst>
               </a:tr>
@@ -14305,28 +14300,28 @@
                 <a:gridCol w="968944">
                   <a:extLst>
                     <a:ext uri="{9D8B030D-6E8A-4147-A177-3AD203B41FA5}">
-                      <a16:colId xmlns="" xmlns:a16="http://schemas.microsoft.com/office/drawing/2014/main" val="2816816517"/>
+                      <a16:colId xmlns:a16="http://schemas.microsoft.com/office/drawing/2014/main" xmlns="" val="2816816517"/>
                     </a:ext>
                   </a:extLst>
                 </a:gridCol>
                 <a:gridCol w="1884347">
                   <a:extLst>
                     <a:ext uri="{9D8B030D-6E8A-4147-A177-3AD203B41FA5}">
-                      <a16:colId xmlns="" xmlns:a16="http://schemas.microsoft.com/office/drawing/2014/main" val="2082632600"/>
+                      <a16:colId xmlns:a16="http://schemas.microsoft.com/office/drawing/2014/main" xmlns="" val="2082632600"/>
                     </a:ext>
                   </a:extLst>
                 </a:gridCol>
                 <a:gridCol w="2434453">
                   <a:extLst>
                     <a:ext uri="{9D8B030D-6E8A-4147-A177-3AD203B41FA5}">
-                      <a16:colId xmlns="" xmlns:a16="http://schemas.microsoft.com/office/drawing/2014/main" val="1705333090"/>
+                      <a16:colId xmlns:a16="http://schemas.microsoft.com/office/drawing/2014/main" xmlns="" val="1705333090"/>
                     </a:ext>
                   </a:extLst>
                 </a:gridCol>
                 <a:gridCol w="2493177">
                   <a:extLst>
                     <a:ext uri="{9D8B030D-6E8A-4147-A177-3AD203B41FA5}">
-                      <a16:colId xmlns="" xmlns:a16="http://schemas.microsoft.com/office/drawing/2014/main" val="1002004627"/>
+                      <a16:colId xmlns:a16="http://schemas.microsoft.com/office/drawing/2014/main" xmlns="" val="1002004627"/>
                     </a:ext>
                   </a:extLst>
                 </a:gridCol>
@@ -14438,7 +14433,7 @@
                 </a:tc>
                 <a:extLst>
                   <a:ext uri="{0D108BD9-81ED-4DB2-BD59-A6C34878D82A}">
-                    <a16:rowId xmlns="" xmlns:a16="http://schemas.microsoft.com/office/drawing/2014/main" val="1459288414"/>
+                    <a16:rowId xmlns:a16="http://schemas.microsoft.com/office/drawing/2014/main" xmlns="" val="1459288414"/>
                   </a:ext>
                 </a:extLst>
               </a:tr>
@@ -14549,7 +14544,7 @@
                 </a:tc>
                 <a:extLst>
                   <a:ext uri="{0D108BD9-81ED-4DB2-BD59-A6C34878D82A}">
-                    <a16:rowId xmlns="" xmlns:a16="http://schemas.microsoft.com/office/drawing/2014/main" val="200150096"/>
+                    <a16:rowId xmlns:a16="http://schemas.microsoft.com/office/drawing/2014/main" xmlns="" val="200150096"/>
                   </a:ext>
                 </a:extLst>
               </a:tr>
@@ -14660,7 +14655,7 @@
                 </a:tc>
                 <a:extLst>
                   <a:ext uri="{0D108BD9-81ED-4DB2-BD59-A6C34878D82A}">
-                    <a16:rowId xmlns="" xmlns:a16="http://schemas.microsoft.com/office/drawing/2014/main" val="1203425802"/>
+                    <a16:rowId xmlns:a16="http://schemas.microsoft.com/office/drawing/2014/main" xmlns="" val="1203425802"/>
                   </a:ext>
                 </a:extLst>
               </a:tr>
@@ -14739,9 +14734,6 @@
                         </a:rPr>
                         <a:t>Lists</a:t>
                       </a:r>
-                      <a:endParaRPr lang="en-AU" sz="1500" dirty="0" smtClean="0">
-                        <a:effectLst/>
-                      </a:endParaRPr>
                     </a:p>
                   </a:txBody>
                   <a:tcPr marL="93268" marR="93268" marT="0" marB="0"/>
@@ -14768,7 +14760,7 @@
                 </a:tc>
                 <a:extLst>
                   <a:ext uri="{0D108BD9-81ED-4DB2-BD59-A6C34878D82A}">
-                    <a16:rowId xmlns="" xmlns:a16="http://schemas.microsoft.com/office/drawing/2014/main" val="2553359360"/>
+                    <a16:rowId xmlns:a16="http://schemas.microsoft.com/office/drawing/2014/main" xmlns="" val="2553359360"/>
                   </a:ext>
                 </a:extLst>
               </a:tr>
@@ -14879,7 +14871,7 @@
                 </a:tc>
                 <a:extLst>
                   <a:ext uri="{0D108BD9-81ED-4DB2-BD59-A6C34878D82A}">
-                    <a16:rowId xmlns="" xmlns:a16="http://schemas.microsoft.com/office/drawing/2014/main" val="2819461663"/>
+                    <a16:rowId xmlns:a16="http://schemas.microsoft.com/office/drawing/2014/main" xmlns="" val="2819461663"/>
                   </a:ext>
                 </a:extLst>
               </a:tr>
@@ -14990,7 +14982,7 @@
                 </a:tc>
                 <a:extLst>
                   <a:ext uri="{0D108BD9-81ED-4DB2-BD59-A6C34878D82A}">
-                    <a16:rowId xmlns="" xmlns:a16="http://schemas.microsoft.com/office/drawing/2014/main" val="2796892357"/>
+                    <a16:rowId xmlns:a16="http://schemas.microsoft.com/office/drawing/2014/main" xmlns="" val="2796892357"/>
                   </a:ext>
                 </a:extLst>
               </a:tr>
@@ -15107,7 +15099,7 @@
                 </a:tc>
                 <a:extLst>
                   <a:ext uri="{0D108BD9-81ED-4DB2-BD59-A6C34878D82A}">
-                    <a16:rowId xmlns="" xmlns:a16="http://schemas.microsoft.com/office/drawing/2014/main" val="1603786101"/>
+                    <a16:rowId xmlns:a16="http://schemas.microsoft.com/office/drawing/2014/main" xmlns="" val="1603786101"/>
                   </a:ext>
                 </a:extLst>
               </a:tr>
@@ -15218,7 +15210,7 @@
                 </a:tc>
                 <a:extLst>
                   <a:ext uri="{0D108BD9-81ED-4DB2-BD59-A6C34878D82A}">
-                    <a16:rowId xmlns="" xmlns:a16="http://schemas.microsoft.com/office/drawing/2014/main" val="3005815023"/>
+                    <a16:rowId xmlns:a16="http://schemas.microsoft.com/office/drawing/2014/main" xmlns="" val="3005815023"/>
                   </a:ext>
                 </a:extLst>
               </a:tr>
@@ -15329,7 +15321,7 @@
                 </a:tc>
                 <a:extLst>
                   <a:ext uri="{0D108BD9-81ED-4DB2-BD59-A6C34878D82A}">
-                    <a16:rowId xmlns="" xmlns:a16="http://schemas.microsoft.com/office/drawing/2014/main" val="1623960316"/>
+                    <a16:rowId xmlns:a16="http://schemas.microsoft.com/office/drawing/2014/main" xmlns="" val="1623960316"/>
                   </a:ext>
                 </a:extLst>
               </a:tr>
@@ -15440,7 +15432,7 @@
                 </a:tc>
                 <a:extLst>
                   <a:ext uri="{0D108BD9-81ED-4DB2-BD59-A6C34878D82A}">
-                    <a16:rowId xmlns="" xmlns:a16="http://schemas.microsoft.com/office/drawing/2014/main" val="454624050"/>
+                    <a16:rowId xmlns:a16="http://schemas.microsoft.com/office/drawing/2014/main" xmlns="" val="454624050"/>
                   </a:ext>
                 </a:extLst>
               </a:tr>
@@ -15551,7 +15543,7 @@
                 </a:tc>
                 <a:extLst>
                   <a:ext uri="{0D108BD9-81ED-4DB2-BD59-A6C34878D82A}">
-                    <a16:rowId xmlns="" xmlns:a16="http://schemas.microsoft.com/office/drawing/2014/main" val="905322406"/>
+                    <a16:rowId xmlns:a16="http://schemas.microsoft.com/office/drawing/2014/main" xmlns="" val="905322406"/>
                   </a:ext>
                 </a:extLst>
               </a:tr>
@@ -15662,7 +15654,7 @@
                 </a:tc>
                 <a:extLst>
                   <a:ext uri="{0D108BD9-81ED-4DB2-BD59-A6C34878D82A}">
-                    <a16:rowId xmlns="" xmlns:a16="http://schemas.microsoft.com/office/drawing/2014/main" val="331737331"/>
+                    <a16:rowId xmlns:a16="http://schemas.microsoft.com/office/drawing/2014/main" xmlns="" val="331737331"/>
                   </a:ext>
                 </a:extLst>
               </a:tr>
@@ -15773,7 +15765,7 @@
                 </a:tc>
                 <a:extLst>
                   <a:ext uri="{0D108BD9-81ED-4DB2-BD59-A6C34878D82A}">
-                    <a16:rowId xmlns="" xmlns:a16="http://schemas.microsoft.com/office/drawing/2014/main" val="1295383036"/>
+                    <a16:rowId xmlns:a16="http://schemas.microsoft.com/office/drawing/2014/main" xmlns="" val="1295383036"/>
                   </a:ext>
                 </a:extLst>
               </a:tr>
@@ -15884,7 +15876,7 @@
                 </a:tc>
                 <a:extLst>
                   <a:ext uri="{0D108BD9-81ED-4DB2-BD59-A6C34878D82A}">
-                    <a16:rowId xmlns="" xmlns:a16="http://schemas.microsoft.com/office/drawing/2014/main" val="932526337"/>
+                    <a16:rowId xmlns:a16="http://schemas.microsoft.com/office/drawing/2014/main" xmlns="" val="932526337"/>
                   </a:ext>
                 </a:extLst>
               </a:tr>
@@ -15995,7 +15987,7 @@
                 </a:tc>
                 <a:extLst>
                   <a:ext uri="{0D108BD9-81ED-4DB2-BD59-A6C34878D82A}">
-                    <a16:rowId xmlns="" xmlns:a16="http://schemas.microsoft.com/office/drawing/2014/main" val="3814481976"/>
+                    <a16:rowId xmlns:a16="http://schemas.microsoft.com/office/drawing/2014/main" xmlns="" val="3814481976"/>
                   </a:ext>
                 </a:extLst>
               </a:tr>
@@ -16106,7 +16098,7 @@
                 </a:tc>
                 <a:extLst>
                   <a:ext uri="{0D108BD9-81ED-4DB2-BD59-A6C34878D82A}">
-                    <a16:rowId xmlns="" xmlns:a16="http://schemas.microsoft.com/office/drawing/2014/main" val="3831280871"/>
+                    <a16:rowId xmlns:a16="http://schemas.microsoft.com/office/drawing/2014/main" xmlns="" val="3831280871"/>
                   </a:ext>
                 </a:extLst>
               </a:tr>
@@ -16217,7 +16209,7 @@
                 </a:tc>
                 <a:extLst>
                   <a:ext uri="{0D108BD9-81ED-4DB2-BD59-A6C34878D82A}">
-                    <a16:rowId xmlns="" xmlns:a16="http://schemas.microsoft.com/office/drawing/2014/main" val="144360989"/>
+                    <a16:rowId xmlns:a16="http://schemas.microsoft.com/office/drawing/2014/main" xmlns="" val="144360989"/>
                   </a:ext>
                 </a:extLst>
               </a:tr>
@@ -16336,21 +16328,21 @@
                 <a:gridCol w="2926410">
                   <a:extLst>
                     <a:ext uri="{9D8B030D-6E8A-4147-A177-3AD203B41FA5}">
-                      <a16:colId xmlns="" xmlns:a16="http://schemas.microsoft.com/office/drawing/2014/main" val="1878650380"/>
+                      <a16:colId xmlns:a16="http://schemas.microsoft.com/office/drawing/2014/main" xmlns="" val="1878650380"/>
                     </a:ext>
                   </a:extLst>
                 </a:gridCol>
                 <a:gridCol w="2024242">
                   <a:extLst>
                     <a:ext uri="{9D8B030D-6E8A-4147-A177-3AD203B41FA5}">
-                      <a16:colId xmlns="" xmlns:a16="http://schemas.microsoft.com/office/drawing/2014/main" val="3514817832"/>
+                      <a16:colId xmlns:a16="http://schemas.microsoft.com/office/drawing/2014/main" xmlns="" val="3514817832"/>
                     </a:ext>
                   </a:extLst>
                 </a:gridCol>
                 <a:gridCol w="3516578">
                   <a:extLst>
                     <a:ext uri="{9D8B030D-6E8A-4147-A177-3AD203B41FA5}">
-                      <a16:colId xmlns="" xmlns:a16="http://schemas.microsoft.com/office/drawing/2014/main" val="1918102830"/>
+                      <a16:colId xmlns:a16="http://schemas.microsoft.com/office/drawing/2014/main" xmlns="" val="1918102830"/>
                     </a:ext>
                   </a:extLst>
                 </a:gridCol>
@@ -16436,7 +16428,7 @@
                 </a:tc>
                 <a:extLst>
                   <a:ext uri="{0D108BD9-81ED-4DB2-BD59-A6C34878D82A}">
-                    <a16:rowId xmlns="" xmlns:a16="http://schemas.microsoft.com/office/drawing/2014/main" val="3083959343"/>
+                    <a16:rowId xmlns:a16="http://schemas.microsoft.com/office/drawing/2014/main" xmlns="" val="3083959343"/>
                   </a:ext>
                 </a:extLst>
               </a:tr>
@@ -16521,7 +16513,7 @@
                 </a:tc>
                 <a:extLst>
                   <a:ext uri="{0D108BD9-81ED-4DB2-BD59-A6C34878D82A}">
-                    <a16:rowId xmlns="" xmlns:a16="http://schemas.microsoft.com/office/drawing/2014/main" val="324899849"/>
+                    <a16:rowId xmlns:a16="http://schemas.microsoft.com/office/drawing/2014/main" xmlns="" val="324899849"/>
                   </a:ext>
                 </a:extLst>
               </a:tr>
@@ -16618,7 +16610,7 @@
                 </a:tc>
                 <a:extLst>
                   <a:ext uri="{0D108BD9-81ED-4DB2-BD59-A6C34878D82A}">
-                    <a16:rowId xmlns="" xmlns:a16="http://schemas.microsoft.com/office/drawing/2014/main" val="1715622986"/>
+                    <a16:rowId xmlns:a16="http://schemas.microsoft.com/office/drawing/2014/main" xmlns="" val="1715622986"/>
                   </a:ext>
                 </a:extLst>
               </a:tr>
@@ -16715,7 +16707,7 @@
                 </a:tc>
                 <a:extLst>
                   <a:ext uri="{0D108BD9-81ED-4DB2-BD59-A6C34878D82A}">
-                    <a16:rowId xmlns="" xmlns:a16="http://schemas.microsoft.com/office/drawing/2014/main" val="2107937398"/>
+                    <a16:rowId xmlns:a16="http://schemas.microsoft.com/office/drawing/2014/main" xmlns="" val="2107937398"/>
                   </a:ext>
                 </a:extLst>
               </a:tr>
@@ -16818,7 +16810,7 @@
                 </a:tc>
                 <a:extLst>
                   <a:ext uri="{0D108BD9-81ED-4DB2-BD59-A6C34878D82A}">
-                    <a16:rowId xmlns="" xmlns:a16="http://schemas.microsoft.com/office/drawing/2014/main" val="77502295"/>
+                    <a16:rowId xmlns:a16="http://schemas.microsoft.com/office/drawing/2014/main" xmlns="" val="77502295"/>
                   </a:ext>
                 </a:extLst>
               </a:tr>
@@ -17104,11 +17096,7 @@
             </a:pPr>
             <a:r>
               <a:rPr lang="en-US" sz="2000" dirty="0" smtClean="0"/>
-              <a:t>Originally</a:t>
-            </a:r>
-            <a:r>
-              <a:rPr lang="en-US" sz="2000" dirty="0" smtClean="0"/>
-              <a:t> called C with classes</a:t>
+              <a:t>Originally called C with classes</a:t>
             </a:r>
           </a:p>
           <a:p>
@@ -17140,7 +17128,6 @@
               <a:rPr lang="en-US" sz="2000" dirty="0" smtClean="0"/>
               <a:t>Includes main OO features</a:t>
             </a:r>
-            <a:endParaRPr lang="en-US" sz="2000" dirty="0" smtClean="0"/>
           </a:p>
           <a:p>
             <a:pPr marL="1657350" lvl="2" indent="-742950">
@@ -17197,7 +17184,6 @@
               <a:rPr lang="en-US" sz="2000" dirty="0" smtClean="0"/>
               <a:t> compiled to  machine exe binary</a:t>
             </a:r>
-            <a:endParaRPr lang="en-US" sz="2000" dirty="0" smtClean="0"/>
           </a:p>
           <a:p>
             <a:pPr marL="2114550" lvl="3" indent="-742950">

</xml_diff>